<commit_message>
PPT updated with SGD & DT
</commit_message>
<xml_diff>
--- a/Maths Project Group 8_PPT.pptx
+++ b/Maths Project Group 8_PPT.pptx
@@ -1175,10 +1175,10 @@
     </dgm:pt>
   </dgm:ptLst>
   <dgm:cxnLst>
+    <dgm:cxn modelId="{D7970950-1AD1-46AE-A58E-7513ED322073}" type="presOf" srcId="{7F41893B-617F-42F8-93F5-F34A3CB3B85F}" destId="{72BF203E-E5F5-460A-AB6C-B8984AF73692}" srcOrd="0" destOrd="0" presId="urn:microsoft.com/office/officeart/2005/8/layout/chevronAccent+Icon"/>
+    <dgm:cxn modelId="{2EC0BC54-3F0F-4FDC-BE34-F20D95693DAA}" srcId="{6069C889-CD56-440E-A535-CB259E466D83}" destId="{74296141-34CF-4C9B-A514-6E31A13ADEBF}" srcOrd="2" destOrd="0" parTransId="{9DFF635E-E752-4E59-93FD-29734439CAE6}" sibTransId="{8DF5F68F-D6D7-4A65-BE9C-392C022BACB8}"/>
     <dgm:cxn modelId="{B8B2B66B-7076-47DC-BF1A-5B5C2FC442FC}" srcId="{6069C889-CD56-440E-A535-CB259E466D83}" destId="{297A74AD-5D88-4122-8840-3729902F1836}" srcOrd="1" destOrd="0" parTransId="{FFF5DF75-BB08-4727-AEF4-DA61332BEC76}" sibTransId="{081BCE80-261D-46EC-8C85-8A4884D38D53}"/>
     <dgm:cxn modelId="{F301F96E-8EA9-4D50-8571-BCB149FA0F32}" srcId="{6069C889-CD56-440E-A535-CB259E466D83}" destId="{7F41893B-617F-42F8-93F5-F34A3CB3B85F}" srcOrd="0" destOrd="0" parTransId="{8BB28695-3CA5-43EB-9330-D05EF57445EC}" sibTransId="{06EB7613-23C5-45A7-BC70-7A124ED9DDD0}"/>
-    <dgm:cxn modelId="{D7970950-1AD1-46AE-A58E-7513ED322073}" type="presOf" srcId="{7F41893B-617F-42F8-93F5-F34A3CB3B85F}" destId="{72BF203E-E5F5-460A-AB6C-B8984AF73692}" srcOrd="0" destOrd="0" presId="urn:microsoft.com/office/officeart/2005/8/layout/chevronAccent+Icon"/>
-    <dgm:cxn modelId="{2EC0BC54-3F0F-4FDC-BE34-F20D95693DAA}" srcId="{6069C889-CD56-440E-A535-CB259E466D83}" destId="{74296141-34CF-4C9B-A514-6E31A13ADEBF}" srcOrd="2" destOrd="0" parTransId="{9DFF635E-E752-4E59-93FD-29734439CAE6}" sibTransId="{8DF5F68F-D6D7-4A65-BE9C-392C022BACB8}"/>
     <dgm:cxn modelId="{A55DEC9C-1C6D-49B1-BAA8-6C708E3BCD78}" type="presOf" srcId="{68E005BB-2FD6-48D3-A0A4-E6FC8AEB8BC1}" destId="{2E1DC597-8D49-4CA3-A1F4-92454FE4C711}" srcOrd="0" destOrd="0" presId="urn:microsoft.com/office/officeart/2005/8/layout/chevronAccent+Icon"/>
     <dgm:cxn modelId="{9D0002A1-2E65-475D-98DF-BB53849AFF66}" srcId="{6069C889-CD56-440E-A535-CB259E466D83}" destId="{43EDEDC6-1E4A-4E2F-87E0-5A75C7849DF2}" srcOrd="4" destOrd="0" parTransId="{135FFFE9-183B-494D-94DB-14B8640E8A78}" sibTransId="{05969436-99C6-4865-A96C-348D08030D0E}"/>
     <dgm:cxn modelId="{45EBA8AB-D087-43C2-85A1-902F63F78694}" type="presOf" srcId="{6069C889-CD56-440E-A535-CB259E466D83}" destId="{BEF64B77-A0F6-4A9C-906D-B5937A6523D1}" srcOrd="0" destOrd="0" presId="urn:microsoft.com/office/officeart/2005/8/layout/chevronAccent+Icon"/>
@@ -3162,7 +3162,7 @@
           <a:p>
             <a:fld id="{AF869721-F543-4A6C-BF9D-65D7CC540427}" type="datetimeFigureOut">
               <a:rPr lang="en-US" smtClean="0"/>
-              <a:t>1/29/2023</a:t>
+              <a:t>1/30/23</a:t>
             </a:fld>
             <a:endParaRPr lang="en-US" dirty="0"/>
           </a:p>
@@ -3339,7 +3339,7 @@
           <a:p>
             <a:fld id="{C732326A-4C88-4AFB-AA5B-5919D81DFF5B}" type="datetimeFigureOut">
               <a:rPr lang="en-US" smtClean="0"/>
-              <a:t>1/29/2023</a:t>
+              <a:t>1/30/23</a:t>
             </a:fld>
             <a:endParaRPr lang="en-US" dirty="0"/>
           </a:p>
@@ -3935,7 +3935,7 @@
           <a:p>
             <a:fld id="{D8EBA636-41F4-4427-B16B-A8BC230606BB}" type="datetime1">
               <a:rPr lang="en-US" smtClean="0"/>
-              <a:t>1/29/2023</a:t>
+              <a:t>1/30/23</a:t>
             </a:fld>
             <a:endParaRPr lang="en-US" dirty="0"/>
           </a:p>
@@ -4198,7 +4198,7 @@
           <a:p>
             <a:fld id="{8BDEDF9F-472F-46A1-9D63-9298EF4FB325}" type="datetime1">
               <a:rPr lang="en-US" smtClean="0"/>
-              <a:t>1/29/2023</a:t>
+              <a:t>1/30/23</a:t>
             </a:fld>
             <a:endParaRPr lang="en-US" dirty="0"/>
           </a:p>
@@ -4434,7 +4434,7 @@
           <a:p>
             <a:fld id="{59D34250-09B5-45A5-AFAE-E1979D0BCF76}" type="datetime1">
               <a:rPr lang="en-US" smtClean="0"/>
-              <a:t>1/29/2023</a:t>
+              <a:t>1/30/23</a:t>
             </a:fld>
             <a:endParaRPr lang="en-US" dirty="0"/>
           </a:p>
@@ -4675,7 +4675,7 @@
           <a:p>
             <a:fld id="{C3E3ED27-7CA0-4835-BE47-59CB871DF8EA}" type="datetime1">
               <a:rPr lang="en-US" smtClean="0"/>
-              <a:t>1/29/2023</a:t>
+              <a:t>1/30/23</a:t>
             </a:fld>
             <a:endParaRPr lang="en-US" dirty="0"/>
           </a:p>
@@ -4983,7 +4983,7 @@
           <a:p>
             <a:fld id="{B4E29E49-C99A-45EF-A1CB-6B22811DF798}" type="datetime1">
               <a:rPr lang="en-US" smtClean="0"/>
-              <a:t>1/29/2023</a:t>
+              <a:t>1/30/23</a:t>
             </a:fld>
             <a:endParaRPr lang="en-US" dirty="0"/>
           </a:p>
@@ -5286,7 +5286,7 @@
           <a:p>
             <a:fld id="{192BEB41-1232-411C-BC05-A27A09DDE945}" type="datetime1">
               <a:rPr lang="en-US" smtClean="0"/>
-              <a:t>1/29/2023</a:t>
+              <a:t>1/30/23</a:t>
             </a:fld>
             <a:endParaRPr lang="en-US" dirty="0"/>
           </a:p>
@@ -5709,7 +5709,7 @@
           <a:p>
             <a:fld id="{90D2DBEA-0B1A-4F83-818A-C2BFF75B0479}" type="datetime1">
               <a:rPr lang="en-US" smtClean="0"/>
-              <a:t>1/29/2023</a:t>
+              <a:t>1/30/23</a:t>
             </a:fld>
             <a:endParaRPr lang="en-US" dirty="0"/>
           </a:p>
@@ -5805,7 +5805,7 @@
           <a:p>
             <a:fld id="{99FED3B1-0CFD-44F4-83B8-9D0E07892912}" type="datetime1">
               <a:rPr lang="en-US" smtClean="0"/>
-              <a:t>1/29/2023</a:t>
+              <a:t>1/30/23</a:t>
             </a:fld>
             <a:endParaRPr lang="en-US" dirty="0"/>
           </a:p>
@@ -5968,7 +5968,7 @@
           <a:p>
             <a:fld id="{2B11F4F2-FFAE-4169-8E5C-356817E38768}" type="datetime1">
               <a:rPr lang="en-US" smtClean="0"/>
-              <a:t>1/29/2023</a:t>
+              <a:t>1/30/23</a:t>
             </a:fld>
             <a:endParaRPr lang="en-US" dirty="0"/>
           </a:p>
@@ -6347,7 +6347,7 @@
           <a:p>
             <a:fld id="{49CA5868-C7F5-4466-970F-DBB7D271E21C}" type="datetime1">
               <a:rPr lang="en-US" smtClean="0"/>
-              <a:t>1/29/2023</a:t>
+              <a:t>1/30/23</a:t>
             </a:fld>
             <a:endParaRPr lang="en-US" dirty="0"/>
           </a:p>
@@ -6637,7 +6637,7 @@
           <a:p>
             <a:fld id="{FFA6AFD5-68DB-430C-9215-6D75AB40091D}" type="datetime1">
               <a:rPr lang="en-US" smtClean="0"/>
-              <a:t>1/29/2023</a:t>
+              <a:t>1/30/23</a:t>
             </a:fld>
             <a:endParaRPr lang="en-US" dirty="0"/>
           </a:p>
@@ -6849,7 +6849,7 @@
           <a:p>
             <a:fld id="{809DF87B-77D8-4557-9510-5E3A32395542}" type="datetime1">
               <a:rPr lang="en-US" smtClean="0"/>
-              <a:t>1/29/2023</a:t>
+              <a:t>1/30/23</a:t>
             </a:fld>
             <a:endParaRPr lang="en-US" dirty="0"/>
           </a:p>
@@ -7753,7 +7753,10 @@
           <a:lstStyle/>
           <a:p>
             <a:pPr algn="ctr"/>
-            <a:endParaRPr lang="en-IN" dirty="0"/>
+            <a:r>
+              <a:rPr lang="en-IN" dirty="0"/>
+              <a:t>Model with tuned parameters &amp; selected features has the better accuracy of 80.4% than the base model with 76.4%</a:t>
+            </a:r>
           </a:p>
         </p:txBody>
       </p:sp>
@@ -7992,7 +7995,13 @@
           <p:cNvGraphicFramePr>
             <a:graphicFrameLocks noGrp="1"/>
           </p:cNvGraphicFramePr>
-          <p:nvPr/>
+          <p:nvPr>
+            <p:extLst>
+              <p:ext uri="{D42A27DB-BD31-4B8C-83A1-F6EECF244321}">
+                <p14:modId xmlns:p14="http://schemas.microsoft.com/office/powerpoint/2010/main" val="858408806"/>
+              </p:ext>
+            </p:extLst>
+          </p:nvPr>
         </p:nvGraphicFramePr>
         <p:xfrm>
           <a:off x="1247608" y="2590800"/>
@@ -8220,17 +8229,23 @@
                     <a:bodyPr/>
                     <a:lstStyle/>
                     <a:p>
-                      <a:endParaRPr lang="en-IN" dirty="0"/>
-                    </a:p>
-                  </a:txBody>
-                  <a:tcPr/>
-                </a:tc>
-                <a:tc>
-                  <a:txBody>
-                    <a:bodyPr/>
-                    <a:lstStyle/>
-                    <a:p>
-                      <a:endParaRPr lang="en-IN" dirty="0"/>
+                      <a:r>
+                        <a:rPr lang="en-IN" dirty="0"/>
+                        <a:t>486</a:t>
+                      </a:r>
+                    </a:p>
+                  </a:txBody>
+                  <a:tcPr/>
+                </a:tc>
+                <a:tc>
+                  <a:txBody>
+                    <a:bodyPr/>
+                    <a:lstStyle/>
+                    <a:p>
+                      <a:r>
+                        <a:rPr lang="en-IN" dirty="0"/>
+                        <a:t> 40</a:t>
+                      </a:r>
                     </a:p>
                   </a:txBody>
                   <a:tcPr/>
@@ -8286,17 +8301,23 @@
                     <a:bodyPr/>
                     <a:lstStyle/>
                     <a:p>
-                      <a:endParaRPr lang="en-IN" dirty="0"/>
-                    </a:p>
-                  </a:txBody>
-                  <a:tcPr/>
-                </a:tc>
-                <a:tc>
-                  <a:txBody>
-                    <a:bodyPr/>
-                    <a:lstStyle/>
-                    <a:p>
-                      <a:endParaRPr lang="en-IN" dirty="0"/>
+                      <a:r>
+                        <a:rPr lang="en-IN" dirty="0"/>
+                        <a:t>155</a:t>
+                      </a:r>
+                    </a:p>
+                  </a:txBody>
+                  <a:tcPr/>
+                </a:tc>
+                <a:tc>
+                  <a:txBody>
+                    <a:bodyPr/>
+                    <a:lstStyle/>
+                    <a:p>
+                      <a:r>
+                        <a:rPr lang="en-IN" dirty="0"/>
+                        <a:t>146</a:t>
+                      </a:r>
                     </a:p>
                   </a:txBody>
                   <a:tcPr/>
@@ -8323,7 +8344,13 @@
           <p:cNvGraphicFramePr>
             <a:graphicFrameLocks noGrp="1"/>
           </p:cNvGraphicFramePr>
-          <p:nvPr/>
+          <p:nvPr>
+            <p:extLst>
+              <p:ext uri="{D42A27DB-BD31-4B8C-83A1-F6EECF244321}">
+                <p14:modId xmlns:p14="http://schemas.microsoft.com/office/powerpoint/2010/main" val="155304786"/>
+              </p:ext>
+            </p:extLst>
+          </p:nvPr>
         </p:nvGraphicFramePr>
         <p:xfrm>
           <a:off x="4900965" y="2590800"/>
@@ -8551,17 +8578,23 @@
                     <a:bodyPr/>
                     <a:lstStyle/>
                     <a:p>
-                      <a:endParaRPr lang="en-IN" dirty="0"/>
-                    </a:p>
-                  </a:txBody>
-                  <a:tcPr/>
-                </a:tc>
-                <a:tc>
-                  <a:txBody>
-                    <a:bodyPr/>
-                    <a:lstStyle/>
-                    <a:p>
-                      <a:endParaRPr lang="en-IN" dirty="0"/>
+                      <a:r>
+                        <a:rPr lang="en-IN" dirty="0"/>
+                        <a:t>442</a:t>
+                      </a:r>
+                    </a:p>
+                  </a:txBody>
+                  <a:tcPr/>
+                </a:tc>
+                <a:tc>
+                  <a:txBody>
+                    <a:bodyPr/>
+                    <a:lstStyle/>
+                    <a:p>
+                      <a:r>
+                        <a:rPr lang="en-IN" dirty="0"/>
+                        <a:t>84</a:t>
+                      </a:r>
                     </a:p>
                   </a:txBody>
                   <a:tcPr/>
@@ -8617,17 +8650,23 @@
                     <a:bodyPr/>
                     <a:lstStyle/>
                     <a:p>
-                      <a:endParaRPr lang="en-IN"/>
-                    </a:p>
-                  </a:txBody>
-                  <a:tcPr/>
-                </a:tc>
-                <a:tc>
-                  <a:txBody>
-                    <a:bodyPr/>
-                    <a:lstStyle/>
-                    <a:p>
-                      <a:endParaRPr lang="en-IN" dirty="0"/>
+                      <a:r>
+                        <a:rPr lang="en-IN" dirty="0"/>
+                        <a:t>86</a:t>
+                      </a:r>
+                    </a:p>
+                  </a:txBody>
+                  <a:tcPr/>
+                </a:tc>
+                <a:tc>
+                  <a:txBody>
+                    <a:bodyPr/>
+                    <a:lstStyle/>
+                    <a:p>
+                      <a:r>
+                        <a:rPr lang="en-IN" dirty="0"/>
+                        <a:t>215</a:t>
+                      </a:r>
                     </a:p>
                   </a:txBody>
                   <a:tcPr/>
@@ -8654,7 +8693,13 @@
           <p:cNvGraphicFramePr>
             <a:graphicFrameLocks noGrp="1"/>
           </p:cNvGraphicFramePr>
-          <p:nvPr/>
+          <p:nvPr>
+            <p:extLst>
+              <p:ext uri="{D42A27DB-BD31-4B8C-83A1-F6EECF244321}">
+                <p14:modId xmlns:p14="http://schemas.microsoft.com/office/powerpoint/2010/main" val="602817754"/>
+              </p:ext>
+            </p:extLst>
+          </p:nvPr>
         </p:nvGraphicFramePr>
         <p:xfrm>
           <a:off x="8932926" y="2579914"/>
@@ -8882,17 +8927,23 @@
                     <a:bodyPr/>
                     <a:lstStyle/>
                     <a:p>
-                      <a:endParaRPr lang="en-IN" dirty="0"/>
-                    </a:p>
-                  </a:txBody>
-                  <a:tcPr/>
-                </a:tc>
-                <a:tc>
-                  <a:txBody>
-                    <a:bodyPr/>
-                    <a:lstStyle/>
-                    <a:p>
-                      <a:endParaRPr lang="en-IN" dirty="0"/>
+                      <a:r>
+                        <a:rPr lang="en-IN" dirty="0"/>
+                        <a:t>441</a:t>
+                      </a:r>
+                    </a:p>
+                  </a:txBody>
+                  <a:tcPr/>
+                </a:tc>
+                <a:tc>
+                  <a:txBody>
+                    <a:bodyPr/>
+                    <a:lstStyle/>
+                    <a:p>
+                      <a:r>
+                        <a:rPr lang="en-IN" dirty="0"/>
+                        <a:t>85</a:t>
+                      </a:r>
                     </a:p>
                   </a:txBody>
                   <a:tcPr/>
@@ -8948,17 +8999,23 @@
                     <a:bodyPr/>
                     <a:lstStyle/>
                     <a:p>
-                      <a:endParaRPr lang="en-IN"/>
-                    </a:p>
-                  </a:txBody>
-                  <a:tcPr/>
-                </a:tc>
-                <a:tc>
-                  <a:txBody>
-                    <a:bodyPr/>
-                    <a:lstStyle/>
-                    <a:p>
-                      <a:endParaRPr lang="en-IN" dirty="0"/>
+                      <a:r>
+                        <a:rPr lang="en-IN" dirty="0"/>
+                        <a:t>77</a:t>
+                      </a:r>
+                    </a:p>
+                  </a:txBody>
+                  <a:tcPr/>
+                </a:tc>
+                <a:tc>
+                  <a:txBody>
+                    <a:bodyPr/>
+                    <a:lstStyle/>
+                    <a:p>
+                      <a:r>
+                        <a:rPr lang="en-IN" dirty="0"/>
+                        <a:t>224</a:t>
+                      </a:r>
                     </a:p>
                   </a:txBody>
                   <a:tcPr/>
@@ -8985,7 +9042,13 @@
           <p:cNvGraphicFramePr>
             <a:graphicFrameLocks noGrp="1"/>
           </p:cNvGraphicFramePr>
-          <p:nvPr/>
+          <p:nvPr>
+            <p:extLst>
+              <p:ext uri="{D42A27DB-BD31-4B8C-83A1-F6EECF244321}">
+                <p14:modId xmlns:p14="http://schemas.microsoft.com/office/powerpoint/2010/main" val="2862296711"/>
+              </p:ext>
+            </p:extLst>
+          </p:nvPr>
         </p:nvGraphicFramePr>
         <p:xfrm>
           <a:off x="446314" y="4770167"/>
@@ -9075,27 +9138,39 @@
                     <a:bodyPr/>
                     <a:lstStyle/>
                     <a:p>
-                      <a:endParaRPr lang="en-IN"/>
-                    </a:p>
-                  </a:txBody>
-                  <a:tcPr/>
-                </a:tc>
-                <a:tc>
-                  <a:txBody>
-                    <a:bodyPr/>
-                    <a:lstStyle/>
-                    <a:p>
-                      <a:endParaRPr lang="en-IN" dirty="0"/>
-                    </a:p>
-                  </a:txBody>
-                  <a:tcPr/>
-                </a:tc>
-                <a:tc>
-                  <a:txBody>
-                    <a:bodyPr/>
-                    <a:lstStyle/>
-                    <a:p>
-                      <a:endParaRPr lang="en-IN" dirty="0"/>
+                      <a:pPr algn="ctr"/>
+                      <a:r>
+                        <a:rPr lang="en-IN" dirty="0"/>
+                        <a:t>0.764</a:t>
+                      </a:r>
+                    </a:p>
+                  </a:txBody>
+                  <a:tcPr/>
+                </a:tc>
+                <a:tc>
+                  <a:txBody>
+                    <a:bodyPr/>
+                    <a:lstStyle/>
+                    <a:p>
+                      <a:pPr algn="ctr"/>
+                      <a:r>
+                        <a:rPr lang="en-IN" dirty="0"/>
+                        <a:t>0.784</a:t>
+                      </a:r>
+                    </a:p>
+                  </a:txBody>
+                  <a:tcPr/>
+                </a:tc>
+                <a:tc>
+                  <a:txBody>
+                    <a:bodyPr/>
+                    <a:lstStyle/>
+                    <a:p>
+                      <a:pPr algn="ctr"/>
+                      <a:r>
+                        <a:rPr lang="en-IN" dirty="0"/>
+                        <a:t>0.485</a:t>
+                      </a:r>
                     </a:p>
                   </a:txBody>
                   <a:tcPr/>
@@ -9122,7 +9197,13 @@
           <p:cNvGraphicFramePr>
             <a:graphicFrameLocks noGrp="1"/>
           </p:cNvGraphicFramePr>
-          <p:nvPr/>
+          <p:nvPr>
+            <p:extLst>
+              <p:ext uri="{D42A27DB-BD31-4B8C-83A1-F6EECF244321}">
+                <p14:modId xmlns:p14="http://schemas.microsoft.com/office/powerpoint/2010/main" val="3397228650"/>
+              </p:ext>
+            </p:extLst>
+          </p:nvPr>
         </p:nvGraphicFramePr>
         <p:xfrm>
           <a:off x="4317382" y="4767944"/>
@@ -9212,27 +9293,39 @@
                     <a:bodyPr/>
                     <a:lstStyle/>
                     <a:p>
-                      <a:endParaRPr lang="en-IN"/>
-                    </a:p>
-                  </a:txBody>
-                  <a:tcPr/>
-                </a:tc>
-                <a:tc>
-                  <a:txBody>
-                    <a:bodyPr/>
-                    <a:lstStyle/>
-                    <a:p>
-                      <a:endParaRPr lang="en-IN" dirty="0"/>
-                    </a:p>
-                  </a:txBody>
-                  <a:tcPr/>
-                </a:tc>
-                <a:tc>
-                  <a:txBody>
-                    <a:bodyPr/>
-                    <a:lstStyle/>
-                    <a:p>
-                      <a:endParaRPr lang="en-IN" dirty="0"/>
+                      <a:pPr algn="ctr"/>
+                      <a:r>
+                        <a:rPr lang="en-IN" dirty="0"/>
+                        <a:t>0.794</a:t>
+                      </a:r>
+                    </a:p>
+                  </a:txBody>
+                  <a:tcPr/>
+                </a:tc>
+                <a:tc>
+                  <a:txBody>
+                    <a:bodyPr/>
+                    <a:lstStyle/>
+                    <a:p>
+                      <a:pPr algn="ctr"/>
+                      <a:r>
+                        <a:rPr lang="en-IN" dirty="0"/>
+                        <a:t>0.719</a:t>
+                      </a:r>
+                    </a:p>
+                  </a:txBody>
+                  <a:tcPr/>
+                </a:tc>
+                <a:tc>
+                  <a:txBody>
+                    <a:bodyPr/>
+                    <a:lstStyle/>
+                    <a:p>
+                      <a:pPr algn="ctr"/>
+                      <a:r>
+                        <a:rPr lang="en-IN" dirty="0"/>
+                        <a:t>0.714</a:t>
+                      </a:r>
                     </a:p>
                   </a:txBody>
                   <a:tcPr/>
@@ -9259,7 +9352,13 @@
           <p:cNvGraphicFramePr>
             <a:graphicFrameLocks noGrp="1"/>
           </p:cNvGraphicFramePr>
-          <p:nvPr/>
+          <p:nvPr>
+            <p:extLst>
+              <p:ext uri="{D42A27DB-BD31-4B8C-83A1-F6EECF244321}">
+                <p14:modId xmlns:p14="http://schemas.microsoft.com/office/powerpoint/2010/main" val="2266089505"/>
+              </p:ext>
+            </p:extLst>
+          </p:nvPr>
         </p:nvGraphicFramePr>
         <p:xfrm>
           <a:off x="8153399" y="4767944"/>
@@ -9349,27 +9448,39 @@
                     <a:bodyPr/>
                     <a:lstStyle/>
                     <a:p>
-                      <a:endParaRPr lang="en-IN" dirty="0"/>
-                    </a:p>
-                  </a:txBody>
-                  <a:tcPr/>
-                </a:tc>
-                <a:tc>
-                  <a:txBody>
-                    <a:bodyPr/>
-                    <a:lstStyle/>
-                    <a:p>
-                      <a:endParaRPr lang="en-IN" dirty="0"/>
-                    </a:p>
-                  </a:txBody>
-                  <a:tcPr/>
-                </a:tc>
-                <a:tc>
-                  <a:txBody>
-                    <a:bodyPr/>
-                    <a:lstStyle/>
-                    <a:p>
-                      <a:endParaRPr lang="en-IN" dirty="0"/>
+                      <a:pPr algn="ctr"/>
+                      <a:r>
+                        <a:rPr lang="en-IN" dirty="0"/>
+                        <a:t>0.804</a:t>
+                      </a:r>
+                    </a:p>
+                  </a:txBody>
+                  <a:tcPr/>
+                </a:tc>
+                <a:tc>
+                  <a:txBody>
+                    <a:bodyPr/>
+                    <a:lstStyle/>
+                    <a:p>
+                      <a:pPr algn="ctr"/>
+                      <a:r>
+                        <a:rPr lang="en-IN" dirty="0"/>
+                        <a:t>0.725</a:t>
+                      </a:r>
+                    </a:p>
+                  </a:txBody>
+                  <a:tcPr/>
+                </a:tc>
+                <a:tc>
+                  <a:txBody>
+                    <a:bodyPr/>
+                    <a:lstStyle/>
+                    <a:p>
+                      <a:pPr algn="ctr"/>
+                      <a:r>
+                        <a:rPr lang="en-IN" dirty="0"/>
+                        <a:t>0.744</a:t>
+                      </a:r>
                     </a:p>
                   </a:txBody>
                   <a:tcPr/>
@@ -9426,7 +9537,15 @@
           <a:lstStyle/>
           <a:p>
             <a:pPr algn="ctr"/>
-            <a:endParaRPr lang="en-IN"/>
+            <a:r>
+              <a:rPr lang="en-CA" dirty="0"/>
+              <a:t>age, education, default, housing, loan, contact, duration, </a:t>
+            </a:r>
+            <a:r>
+              <a:rPr lang="en-CA" dirty="0" err="1"/>
+              <a:t>poutcome</a:t>
+            </a:r>
+            <a:endParaRPr lang="en-IN" dirty="0"/>
           </a:p>
         </p:txBody>
       </p:sp>
@@ -9472,7 +9591,35 @@
           <a:lstStyle/>
           <a:p>
             <a:pPr algn="ctr"/>
-            <a:endParaRPr lang="en-IN"/>
+            <a:r>
+              <a:rPr lang="en-CA" dirty="0"/>
+              <a:t>penalty: L2, loss: </a:t>
+            </a:r>
+            <a:r>
+              <a:rPr lang="en-CA" dirty="0" err="1"/>
+              <a:t>modified_huber</a:t>
+            </a:r>
+            <a:r>
+              <a:rPr lang="en-CA" dirty="0"/>
+              <a:t>, </a:t>
+            </a:r>
+            <a:r>
+              <a:rPr lang="en-CA" dirty="0" err="1"/>
+              <a:t>learning_rate</a:t>
+            </a:r>
+            <a:r>
+              <a:rPr lang="en-CA" dirty="0"/>
+              <a:t>: </a:t>
+            </a:r>
+            <a:r>
+              <a:rPr lang="en-CA" dirty="0" err="1"/>
+              <a:t>invscaling</a:t>
+            </a:r>
+            <a:r>
+              <a:rPr lang="en-CA" dirty="0"/>
+              <a:t>, eta0: 1, alpha: 0.001</a:t>
+            </a:r>
+            <a:endParaRPr lang="en-IN" dirty="0"/>
           </a:p>
         </p:txBody>
       </p:sp>
@@ -9519,58 +9666,6 @@
           <a:p>
             <a:pPr algn="ctr"/>
             <a:endParaRPr lang="en-IN"/>
-          </a:p>
-        </p:txBody>
-      </p:sp>
-      <p:sp>
-        <p:nvSpPr>
-          <p:cNvPr id="2" name="Rectangle 1">
-            <a:extLst>
-              <a:ext uri="{FF2B5EF4-FFF2-40B4-BE49-F238E27FC236}">
-                <a16:creationId xmlns:a16="http://schemas.microsoft.com/office/drawing/2014/main" id="{F3E48B56-DFDD-FB30-D723-D15376EA5B95}"/>
-              </a:ext>
-            </a:extLst>
-          </p:cNvPr>
-          <p:cNvSpPr/>
-          <p:nvPr/>
-        </p:nvSpPr>
-        <p:spPr>
-          <a:xfrm>
-            <a:off x="9448800" y="185057"/>
-            <a:ext cx="2743200" cy="4103914"/>
-          </a:xfrm>
-          <a:prstGeom prst="rect">
-            <a:avLst/>
-          </a:prstGeom>
-          <a:solidFill>
-            <a:srgbClr val="FF0000"/>
-          </a:solidFill>
-        </p:spPr>
-        <p:style>
-          <a:lnRef idx="2">
-            <a:schemeClr val="accent1">
-              <a:shade val="50000"/>
-            </a:schemeClr>
-          </a:lnRef>
-          <a:fillRef idx="1">
-            <a:schemeClr val="accent1"/>
-          </a:fillRef>
-          <a:effectRef idx="0">
-            <a:schemeClr val="accent1"/>
-          </a:effectRef>
-          <a:fontRef idx="minor">
-            <a:schemeClr val="lt1"/>
-          </a:fontRef>
-        </p:style>
-        <p:txBody>
-          <a:bodyPr rtlCol="0" anchor="ctr"/>
-          <a:lstStyle/>
-          <a:p>
-            <a:pPr algn="ctr"/>
-            <a:r>
-              <a:rPr lang="en-IN" dirty="0"/>
-              <a:t>NEED TO COMPLETE</a:t>
-            </a:r>
           </a:p>
         </p:txBody>
       </p:sp>
@@ -21331,7 +21426,10 @@
           <a:lstStyle/>
           <a:p>
             <a:pPr algn="ctr"/>
-            <a:endParaRPr lang="en-IN" dirty="0"/>
+            <a:r>
+              <a:rPr lang="en-IN" dirty="0"/>
+              <a:t>Model tuned with parameters with selected features gave the best accuracy of 81.7%</a:t>
+            </a:r>
           </a:p>
         </p:txBody>
       </p:sp>
@@ -21570,7 +21668,13 @@
           <p:cNvGraphicFramePr>
             <a:graphicFrameLocks noGrp="1"/>
           </p:cNvGraphicFramePr>
-          <p:nvPr/>
+          <p:nvPr>
+            <p:extLst>
+              <p:ext uri="{D42A27DB-BD31-4B8C-83A1-F6EECF244321}">
+                <p14:modId xmlns:p14="http://schemas.microsoft.com/office/powerpoint/2010/main" val="2837809846"/>
+              </p:ext>
+            </p:extLst>
+          </p:nvPr>
         </p:nvGraphicFramePr>
         <p:xfrm>
           <a:off x="1247608" y="2590800"/>
@@ -21798,17 +21902,23 @@
                     <a:bodyPr/>
                     <a:lstStyle/>
                     <a:p>
-                      <a:endParaRPr lang="en-IN" dirty="0"/>
-                    </a:p>
-                  </a:txBody>
-                  <a:tcPr/>
-                </a:tc>
-                <a:tc>
-                  <a:txBody>
-                    <a:bodyPr/>
-                    <a:lstStyle/>
-                    <a:p>
-                      <a:endParaRPr lang="en-IN" dirty="0"/>
+                      <a:r>
+                        <a:rPr lang="en-IN" dirty="0"/>
+                        <a:t>425</a:t>
+                      </a:r>
+                    </a:p>
+                  </a:txBody>
+                  <a:tcPr/>
+                </a:tc>
+                <a:tc>
+                  <a:txBody>
+                    <a:bodyPr/>
+                    <a:lstStyle/>
+                    <a:p>
+                      <a:r>
+                        <a:rPr lang="en-IN" dirty="0"/>
+                        <a:t>101</a:t>
+                      </a:r>
                     </a:p>
                   </a:txBody>
                   <a:tcPr/>
@@ -21864,17 +21974,23 @@
                     <a:bodyPr/>
                     <a:lstStyle/>
                     <a:p>
-                      <a:endParaRPr lang="en-IN" dirty="0"/>
-                    </a:p>
-                  </a:txBody>
-                  <a:tcPr/>
-                </a:tc>
-                <a:tc>
-                  <a:txBody>
-                    <a:bodyPr/>
-                    <a:lstStyle/>
-                    <a:p>
-                      <a:endParaRPr lang="en-IN" dirty="0"/>
+                      <a:r>
+                        <a:rPr lang="en-IN" dirty="0"/>
+                        <a:t>121</a:t>
+                      </a:r>
+                    </a:p>
+                  </a:txBody>
+                  <a:tcPr/>
+                </a:tc>
+                <a:tc>
+                  <a:txBody>
+                    <a:bodyPr/>
+                    <a:lstStyle/>
+                    <a:p>
+                      <a:r>
+                        <a:rPr lang="en-IN" dirty="0"/>
+                        <a:t>180</a:t>
+                      </a:r>
                     </a:p>
                   </a:txBody>
                   <a:tcPr/>
@@ -21901,7 +22017,13 @@
           <p:cNvGraphicFramePr>
             <a:graphicFrameLocks noGrp="1"/>
           </p:cNvGraphicFramePr>
-          <p:nvPr/>
+          <p:nvPr>
+            <p:extLst>
+              <p:ext uri="{D42A27DB-BD31-4B8C-83A1-F6EECF244321}">
+                <p14:modId xmlns:p14="http://schemas.microsoft.com/office/powerpoint/2010/main" val="4279045369"/>
+              </p:ext>
+            </p:extLst>
+          </p:nvPr>
         </p:nvGraphicFramePr>
         <p:xfrm>
           <a:off x="4900965" y="2590800"/>
@@ -22129,17 +22251,23 @@
                     <a:bodyPr/>
                     <a:lstStyle/>
                     <a:p>
-                      <a:endParaRPr lang="en-IN" dirty="0"/>
-                    </a:p>
-                  </a:txBody>
-                  <a:tcPr/>
-                </a:tc>
-                <a:tc>
-                  <a:txBody>
-                    <a:bodyPr/>
-                    <a:lstStyle/>
-                    <a:p>
-                      <a:endParaRPr lang="en-IN" dirty="0"/>
+                      <a:r>
+                        <a:rPr lang="en-IN" dirty="0"/>
+                        <a:t>448</a:t>
+                      </a:r>
+                    </a:p>
+                  </a:txBody>
+                  <a:tcPr/>
+                </a:tc>
+                <a:tc>
+                  <a:txBody>
+                    <a:bodyPr/>
+                    <a:lstStyle/>
+                    <a:p>
+                      <a:r>
+                        <a:rPr lang="en-IN" dirty="0"/>
+                        <a:t>78</a:t>
+                      </a:r>
                     </a:p>
                   </a:txBody>
                   <a:tcPr/>
@@ -22195,17 +22323,23 @@
                     <a:bodyPr/>
                     <a:lstStyle/>
                     <a:p>
-                      <a:endParaRPr lang="en-IN"/>
-                    </a:p>
-                  </a:txBody>
-                  <a:tcPr/>
-                </a:tc>
-                <a:tc>
-                  <a:txBody>
-                    <a:bodyPr/>
-                    <a:lstStyle/>
-                    <a:p>
-                      <a:endParaRPr lang="en-IN" dirty="0"/>
+                      <a:r>
+                        <a:rPr lang="en-IN" dirty="0"/>
+                        <a:t>110</a:t>
+                      </a:r>
+                    </a:p>
+                  </a:txBody>
+                  <a:tcPr/>
+                </a:tc>
+                <a:tc>
+                  <a:txBody>
+                    <a:bodyPr/>
+                    <a:lstStyle/>
+                    <a:p>
+                      <a:r>
+                        <a:rPr lang="en-IN" dirty="0"/>
+                        <a:t>191</a:t>
+                      </a:r>
                     </a:p>
                   </a:txBody>
                   <a:tcPr/>
@@ -22232,7 +22366,13 @@
           <p:cNvGraphicFramePr>
             <a:graphicFrameLocks noGrp="1"/>
           </p:cNvGraphicFramePr>
-          <p:nvPr/>
+          <p:nvPr>
+            <p:extLst>
+              <p:ext uri="{D42A27DB-BD31-4B8C-83A1-F6EECF244321}">
+                <p14:modId xmlns:p14="http://schemas.microsoft.com/office/powerpoint/2010/main" val="1161702234"/>
+              </p:ext>
+            </p:extLst>
+          </p:nvPr>
         </p:nvGraphicFramePr>
         <p:xfrm>
           <a:off x="8932926" y="2579914"/>
@@ -22460,17 +22600,23 @@
                     <a:bodyPr/>
                     <a:lstStyle/>
                     <a:p>
-                      <a:endParaRPr lang="en-IN" dirty="0"/>
-                    </a:p>
-                  </a:txBody>
-                  <a:tcPr/>
-                </a:tc>
-                <a:tc>
-                  <a:txBody>
-                    <a:bodyPr/>
-                    <a:lstStyle/>
-                    <a:p>
-                      <a:endParaRPr lang="en-IN" dirty="0"/>
+                      <a:r>
+                        <a:rPr lang="en-IN" dirty="0"/>
+                        <a:t>462</a:t>
+                      </a:r>
+                    </a:p>
+                  </a:txBody>
+                  <a:tcPr/>
+                </a:tc>
+                <a:tc>
+                  <a:txBody>
+                    <a:bodyPr/>
+                    <a:lstStyle/>
+                    <a:p>
+                      <a:r>
+                        <a:rPr lang="en-IN" dirty="0"/>
+                        <a:t>64</a:t>
+                      </a:r>
                     </a:p>
                   </a:txBody>
                   <a:tcPr/>
@@ -22526,17 +22672,23 @@
                     <a:bodyPr/>
                     <a:lstStyle/>
                     <a:p>
-                      <a:endParaRPr lang="en-IN"/>
-                    </a:p>
-                  </a:txBody>
-                  <a:tcPr/>
-                </a:tc>
-                <a:tc>
-                  <a:txBody>
-                    <a:bodyPr/>
-                    <a:lstStyle/>
-                    <a:p>
-                      <a:endParaRPr lang="en-IN" dirty="0"/>
+                      <a:r>
+                        <a:rPr lang="en-IN" dirty="0"/>
+                        <a:t>87</a:t>
+                      </a:r>
+                    </a:p>
+                  </a:txBody>
+                  <a:tcPr/>
+                </a:tc>
+                <a:tc>
+                  <a:txBody>
+                    <a:bodyPr/>
+                    <a:lstStyle/>
+                    <a:p>
+                      <a:r>
+                        <a:rPr lang="en-IN" dirty="0"/>
+                        <a:t>214</a:t>
+                      </a:r>
                     </a:p>
                   </a:txBody>
                   <a:tcPr/>
@@ -22563,7 +22715,13 @@
           <p:cNvGraphicFramePr>
             <a:graphicFrameLocks noGrp="1"/>
           </p:cNvGraphicFramePr>
-          <p:nvPr/>
+          <p:nvPr>
+            <p:extLst>
+              <p:ext uri="{D42A27DB-BD31-4B8C-83A1-F6EECF244321}">
+                <p14:modId xmlns:p14="http://schemas.microsoft.com/office/powerpoint/2010/main" val="3376786978"/>
+              </p:ext>
+            </p:extLst>
+          </p:nvPr>
         </p:nvGraphicFramePr>
         <p:xfrm>
           <a:off x="446314" y="4770167"/>
@@ -22653,27 +22811,39 @@
                     <a:bodyPr/>
                     <a:lstStyle/>
                     <a:p>
-                      <a:endParaRPr lang="en-IN"/>
-                    </a:p>
-                  </a:txBody>
-                  <a:tcPr/>
-                </a:tc>
-                <a:tc>
-                  <a:txBody>
-                    <a:bodyPr/>
-                    <a:lstStyle/>
-                    <a:p>
-                      <a:endParaRPr lang="en-IN" dirty="0"/>
-                    </a:p>
-                  </a:txBody>
-                  <a:tcPr/>
-                </a:tc>
-                <a:tc>
-                  <a:txBody>
-                    <a:bodyPr/>
-                    <a:lstStyle/>
-                    <a:p>
-                      <a:endParaRPr lang="en-IN" dirty="0"/>
+                      <a:pPr algn="ctr"/>
+                      <a:r>
+                        <a:rPr lang="en-IN" dirty="0"/>
+                        <a:t>0.731</a:t>
+                      </a:r>
+                    </a:p>
+                  </a:txBody>
+                  <a:tcPr/>
+                </a:tc>
+                <a:tc>
+                  <a:txBody>
+                    <a:bodyPr/>
+                    <a:lstStyle/>
+                    <a:p>
+                      <a:pPr algn="ctr"/>
+                      <a:r>
+                        <a:rPr lang="en-IN" dirty="0"/>
+                        <a:t>0.641</a:t>
+                      </a:r>
+                    </a:p>
+                  </a:txBody>
+                  <a:tcPr/>
+                </a:tc>
+                <a:tc>
+                  <a:txBody>
+                    <a:bodyPr/>
+                    <a:lstStyle/>
+                    <a:p>
+                      <a:pPr algn="ctr"/>
+                      <a:r>
+                        <a:rPr lang="en-IN" dirty="0"/>
+                        <a:t>0.598</a:t>
+                      </a:r>
                     </a:p>
                   </a:txBody>
                   <a:tcPr/>
@@ -22700,7 +22870,13 @@
           <p:cNvGraphicFramePr>
             <a:graphicFrameLocks noGrp="1"/>
           </p:cNvGraphicFramePr>
-          <p:nvPr/>
+          <p:nvPr>
+            <p:extLst>
+              <p:ext uri="{D42A27DB-BD31-4B8C-83A1-F6EECF244321}">
+                <p14:modId xmlns:p14="http://schemas.microsoft.com/office/powerpoint/2010/main" val="1811226671"/>
+              </p:ext>
+            </p:extLst>
+          </p:nvPr>
         </p:nvGraphicFramePr>
         <p:xfrm>
           <a:off x="4317382" y="4767944"/>
@@ -22790,27 +22966,39 @@
                     <a:bodyPr/>
                     <a:lstStyle/>
                     <a:p>
-                      <a:endParaRPr lang="en-IN"/>
-                    </a:p>
-                  </a:txBody>
-                  <a:tcPr/>
-                </a:tc>
-                <a:tc>
-                  <a:txBody>
-                    <a:bodyPr/>
-                    <a:lstStyle/>
-                    <a:p>
-                      <a:endParaRPr lang="en-IN" dirty="0"/>
-                    </a:p>
-                  </a:txBody>
-                  <a:tcPr/>
-                </a:tc>
-                <a:tc>
-                  <a:txBody>
-                    <a:bodyPr/>
-                    <a:lstStyle/>
-                    <a:p>
-                      <a:endParaRPr lang="en-IN" dirty="0"/>
+                      <a:pPr algn="ctr"/>
+                      <a:r>
+                        <a:rPr lang="en-IN" dirty="0"/>
+                        <a:t>0.772</a:t>
+                      </a:r>
+                    </a:p>
+                  </a:txBody>
+                  <a:tcPr/>
+                </a:tc>
+                <a:tc>
+                  <a:txBody>
+                    <a:bodyPr/>
+                    <a:lstStyle/>
+                    <a:p>
+                      <a:pPr algn="ctr"/>
+                      <a:r>
+                        <a:rPr lang="en-IN" dirty="0"/>
+                        <a:t>0.710</a:t>
+                      </a:r>
+                    </a:p>
+                  </a:txBody>
+                  <a:tcPr/>
+                </a:tc>
+                <a:tc>
+                  <a:txBody>
+                    <a:bodyPr/>
+                    <a:lstStyle/>
+                    <a:p>
+                      <a:pPr algn="ctr"/>
+                      <a:r>
+                        <a:rPr lang="en-IN" dirty="0"/>
+                        <a:t>0.634</a:t>
+                      </a:r>
                     </a:p>
                   </a:txBody>
                   <a:tcPr/>
@@ -22837,7 +23025,13 @@
           <p:cNvGraphicFramePr>
             <a:graphicFrameLocks noGrp="1"/>
           </p:cNvGraphicFramePr>
-          <p:nvPr/>
+          <p:nvPr>
+            <p:extLst>
+              <p:ext uri="{D42A27DB-BD31-4B8C-83A1-F6EECF244321}">
+                <p14:modId xmlns:p14="http://schemas.microsoft.com/office/powerpoint/2010/main" val="2537502645"/>
+              </p:ext>
+            </p:extLst>
+          </p:nvPr>
         </p:nvGraphicFramePr>
         <p:xfrm>
           <a:off x="8153399" y="4767944"/>
@@ -22927,27 +23121,39 @@
                     <a:bodyPr/>
                     <a:lstStyle/>
                     <a:p>
-                      <a:endParaRPr lang="en-IN" dirty="0"/>
-                    </a:p>
-                  </a:txBody>
-                  <a:tcPr/>
-                </a:tc>
-                <a:tc>
-                  <a:txBody>
-                    <a:bodyPr/>
-                    <a:lstStyle/>
-                    <a:p>
-                      <a:endParaRPr lang="en-IN" dirty="0"/>
-                    </a:p>
-                  </a:txBody>
-                  <a:tcPr/>
-                </a:tc>
-                <a:tc>
-                  <a:txBody>
-                    <a:bodyPr/>
-                    <a:lstStyle/>
-                    <a:p>
-                      <a:endParaRPr lang="en-IN" dirty="0"/>
+                      <a:pPr algn="ctr"/>
+                      <a:r>
+                        <a:rPr lang="en-IN" dirty="0"/>
+                        <a:t>0.817</a:t>
+                      </a:r>
+                    </a:p>
+                  </a:txBody>
+                  <a:tcPr/>
+                </a:tc>
+                <a:tc>
+                  <a:txBody>
+                    <a:bodyPr/>
+                    <a:lstStyle/>
+                    <a:p>
+                      <a:pPr algn="ctr"/>
+                      <a:r>
+                        <a:rPr lang="en-IN" dirty="0"/>
+                        <a:t>0.769</a:t>
+                      </a:r>
+                    </a:p>
+                  </a:txBody>
+                  <a:tcPr/>
+                </a:tc>
+                <a:tc>
+                  <a:txBody>
+                    <a:bodyPr/>
+                    <a:lstStyle/>
+                    <a:p>
+                      <a:pPr algn="ctr"/>
+                      <a:r>
+                        <a:rPr lang="en-IN" dirty="0"/>
+                        <a:t>0.710</a:t>
+                      </a:r>
                     </a:p>
                   </a:txBody>
                   <a:tcPr/>
@@ -23004,7 +23210,23 @@
           <a:lstStyle/>
           <a:p>
             <a:pPr algn="ctr"/>
-            <a:endParaRPr lang="en-IN"/>
+            <a:r>
+              <a:rPr lang="en-IN" dirty="0"/>
+              <a:t>Balance, Day, Month, Duration, </a:t>
+            </a:r>
+            <a:r>
+              <a:rPr lang="en-IN" dirty="0" err="1"/>
+              <a:t>Pdays</a:t>
+            </a:r>
+            <a:r>
+              <a:rPr lang="en-IN" dirty="0"/>
+              <a:t>,  </a:t>
+            </a:r>
+            <a:r>
+              <a:rPr lang="en-IN" dirty="0" err="1"/>
+              <a:t>Poutcome</a:t>
+            </a:r>
+            <a:endParaRPr lang="en-IN" dirty="0"/>
           </a:p>
         </p:txBody>
       </p:sp>
@@ -23050,7 +23272,32 @@
           <a:lstStyle/>
           <a:p>
             <a:pPr algn="ctr"/>
-            <a:endParaRPr lang="en-IN"/>
+            <a:r>
+              <a:rPr lang="en-IN" dirty="0" err="1"/>
+              <a:t>min_samples_leaf</a:t>
+            </a:r>
+            <a:r>
+              <a:rPr lang="en-IN" dirty="0"/>
+              <a:t> = 5</a:t>
+            </a:r>
+          </a:p>
+          <a:p>
+            <a:pPr algn="ctr"/>
+            <a:r>
+              <a:rPr lang="en-IN" dirty="0" err="1"/>
+              <a:t>max_depth</a:t>
+            </a:r>
+            <a:r>
+              <a:rPr lang="en-IN" dirty="0"/>
+              <a:t> = 5</a:t>
+            </a:r>
+          </a:p>
+          <a:p>
+            <a:pPr algn="ctr"/>
+            <a:r>
+              <a:rPr lang="en-IN" dirty="0"/>
+              <a:t>criterion = entropy</a:t>
+            </a:r>
           </a:p>
         </p:txBody>
       </p:sp>
@@ -24516,7 +24763,7 @@
           <p:nvPr>
             <p:extLst>
               <p:ext uri="{D42A27DB-BD31-4B8C-83A1-F6EECF244321}">
-                <p14:modId xmlns:p14="http://schemas.microsoft.com/office/powerpoint/2010/main" val="3628866139"/>
+                <p14:modId xmlns:p14="http://schemas.microsoft.com/office/powerpoint/2010/main" val="1797545595"/>
               </p:ext>
             </p:extLst>
           </p:nvPr>
@@ -24609,6 +24856,7 @@
                     <a:bodyPr/>
                     <a:lstStyle/>
                     <a:p>
+                      <a:pPr algn="ctr"/>
                       <a:r>
                         <a:rPr lang="en-IN" dirty="0"/>
                         <a:t>0.827</a:t>
@@ -24622,6 +24870,7 @@
                     <a:bodyPr/>
                     <a:lstStyle/>
                     <a:p>
+                      <a:pPr algn="ctr"/>
                       <a:r>
                         <a:rPr lang="en-IN" dirty="0"/>
                         <a:t>0.782</a:t>
@@ -24635,6 +24884,7 @@
                     <a:bodyPr/>
                     <a:lstStyle/>
                     <a:p>
+                      <a:pPr algn="ctr"/>
                       <a:r>
                         <a:rPr lang="en-IN" dirty="0"/>
                         <a:t>0.728</a:t>
@@ -24668,7 +24918,7 @@
           <p:nvPr>
             <p:extLst>
               <p:ext uri="{D42A27DB-BD31-4B8C-83A1-F6EECF244321}">
-                <p14:modId xmlns:p14="http://schemas.microsoft.com/office/powerpoint/2010/main" val="2719279135"/>
+                <p14:modId xmlns:p14="http://schemas.microsoft.com/office/powerpoint/2010/main" val="3548945182"/>
               </p:ext>
             </p:extLst>
           </p:nvPr>
@@ -24761,6 +25011,7 @@
                     <a:bodyPr/>
                     <a:lstStyle/>
                     <a:p>
+                      <a:pPr algn="ctr"/>
                       <a:r>
                         <a:rPr lang="en-IN" dirty="0"/>
                         <a:t>0.817</a:t>
@@ -24774,6 +25025,7 @@
                     <a:bodyPr/>
                     <a:lstStyle/>
                     <a:p>
+                      <a:pPr algn="ctr"/>
                       <a:r>
                         <a:rPr lang="en-IN" dirty="0"/>
                         <a:t>0.766</a:t>
@@ -24787,6 +25039,7 @@
                     <a:bodyPr/>
                     <a:lstStyle/>
                     <a:p>
+                      <a:pPr algn="ctr"/>
                       <a:r>
                         <a:rPr lang="en-IN" dirty="0"/>
                         <a:t>0.717</a:t>
@@ -24820,7 +25073,7 @@
           <p:nvPr>
             <p:extLst>
               <p:ext uri="{D42A27DB-BD31-4B8C-83A1-F6EECF244321}">
-                <p14:modId xmlns:p14="http://schemas.microsoft.com/office/powerpoint/2010/main" val="1180954427"/>
+                <p14:modId xmlns:p14="http://schemas.microsoft.com/office/powerpoint/2010/main" val="411487518"/>
               </p:ext>
             </p:extLst>
           </p:nvPr>
@@ -24913,6 +25166,7 @@
                     <a:bodyPr/>
                     <a:lstStyle/>
                     <a:p>
+                      <a:pPr algn="ctr"/>
                       <a:r>
                         <a:rPr lang="en-IN" dirty="0"/>
                         <a:t>0.830</a:t>
@@ -24926,6 +25180,7 @@
                     <a:bodyPr/>
                     <a:lstStyle/>
                     <a:p>
+                      <a:pPr algn="ctr"/>
                       <a:r>
                         <a:rPr lang="en-IN" dirty="0"/>
                         <a:t>0.786</a:t>
@@ -24939,6 +25194,7 @@
                     <a:bodyPr/>
                     <a:lstStyle/>
                     <a:p>
+                      <a:pPr algn="ctr"/>
                       <a:r>
                         <a:rPr lang="en-IN" dirty="0"/>
                         <a:t>0.731</a:t>
@@ -25998,15 +26254,6 @@
 </file>
 
 <file path=customXml/item1.xml><?xml version="1.0" encoding="utf-8"?>
-<?mso-contentType ?>
-<FormTemplates xmlns="http://schemas.microsoft.com/sharepoint/v3/contenttype/forms">
-  <Display>DocumentLibraryForm</Display>
-  <Edit>DocumentLibraryForm</Edit>
-  <New>DocumentLibraryForm</New>
-</FormTemplates>
-</file>
-
-<file path=customXml/item2.xml><?xml version="1.0" encoding="utf-8"?>
 <ct:contentTypeSchema xmlns:ct="http://schemas.microsoft.com/office/2006/metadata/contentType" xmlns:ma="http://schemas.microsoft.com/office/2006/metadata/properties/metaAttributes" ct:_="" ma:_="" ma:contentTypeName="Document" ma:contentTypeID="0x010100F36457C182656244ABB3F5DD88E359DF" ma:contentTypeVersion="3" ma:contentTypeDescription="Create a new document." ma:contentTypeScope="" ma:versionID="0feedaede6530cef8f766ec2997f34bc">
   <xsd:schema xmlns:xsd="http://www.w3.org/2001/XMLSchema" xmlns:xs="http://www.w3.org/2001/XMLSchema" xmlns:p="http://schemas.microsoft.com/office/2006/metadata/properties" xmlns:ns3="8dda4fe5-82ff-4f0a-b786-3235f59dec5c" targetNamespace="http://schemas.microsoft.com/office/2006/metadata/properties" ma:root="true" ma:fieldsID="574d210ba6bd0bfee26a4f68e28ecce1" ns3:_="">
     <xsd:import namespace="8dda4fe5-82ff-4f0a-b786-3235f59dec5c"/>
@@ -26144,6 +26391,15 @@
 </ct:contentTypeSchema>
 </file>
 
+<file path=customXml/item2.xml><?xml version="1.0" encoding="utf-8"?>
+<?mso-contentType ?>
+<FormTemplates xmlns="http://schemas.microsoft.com/sharepoint/v3/contenttype/forms">
+  <Display>DocumentLibraryForm</Display>
+  <Edit>DocumentLibraryForm</Edit>
+  <New>DocumentLibraryForm</New>
+</FormTemplates>
+</file>
+
 <file path=customXml/item3.xml><?xml version="1.0" encoding="utf-8"?>
 <p:properties xmlns:p="http://schemas.microsoft.com/office/2006/metadata/properties" xmlns:xsi="http://www.w3.org/2001/XMLSchema-instance" xmlns:pc="http://schemas.microsoft.com/office/infopath/2007/PartnerControls">
   <documentManagement/>
@@ -26151,14 +26407,6 @@
 </file>
 
 <file path=customXml/itemProps1.xml><?xml version="1.0" encoding="utf-8"?>
-<ds:datastoreItem xmlns:ds="http://schemas.openxmlformats.org/officeDocument/2006/customXml" ds:itemID="{10AE5D88-66BB-491D-8D7E-93A31C04B0CB}">
-  <ds:schemaRefs>
-    <ds:schemaRef ds:uri="http://schemas.microsoft.com/sharepoint/v3/contenttype/forms"/>
-  </ds:schemaRefs>
-</ds:datastoreItem>
-</file>
-
-<file path=customXml/itemProps2.xml><?xml version="1.0" encoding="utf-8"?>
 <ds:datastoreItem xmlns:ds="http://schemas.openxmlformats.org/officeDocument/2006/customXml" ds:itemID="{BEEC3045-CC4B-41FD-91FC-E700309A8C8F}">
   <ds:schemaRefs>
     <ds:schemaRef ds:uri="http://schemas.microsoft.com/office/2006/metadata/contentType"/>
@@ -26172,6 +26420,14 @@
     <ds:schemaRef ds:uri="http://purl.org/dc/elements/1.1/"/>
     <ds:schemaRef ds:uri="http://purl.org/dc/terms/"/>
     <ds:schemaRef ds:uri="http://schemas.microsoft.com/internal/obd"/>
+  </ds:schemaRefs>
+</ds:datastoreItem>
+</file>
+
+<file path=customXml/itemProps2.xml><?xml version="1.0" encoding="utf-8"?>
+<ds:datastoreItem xmlns:ds="http://schemas.openxmlformats.org/officeDocument/2006/customXml" ds:itemID="{10AE5D88-66BB-491D-8D7E-93A31C04B0CB}">
+  <ds:schemaRefs>
+    <ds:schemaRef ds:uri="http://schemas.microsoft.com/sharepoint/v3/contenttype/forms"/>
   </ds:schemaRefs>
 </ds:datastoreItem>
 </file>

</xml_diff>